<commit_message>
Signed-off-by: Cheng Li <scrappedprince.li@gmail.com>
</commit_message>
<xml_diff>
--- a/quantlib/CAL-SWIG/Python/notebooks/TP/实时收益率曲线.pptx
+++ b/quantlib/CAL-SWIG/Python/notebooks/TP/实时收益率曲线.pptx
@@ -488,8 +488,8 @@
           <c:showBubbleSize val="0"/>
         </c:dLbls>
         <c:gapWidth val="150"/>
-        <c:axId val="179644688"/>
-        <c:axId val="179290328"/>
+        <c:axId val="204628712"/>
+        <c:axId val="204629096"/>
       </c:barChart>
       <c:lineChart>
         <c:grouping val="standard"/>
@@ -776,11 +776,11 @@
         </c:dLbls>
         <c:marker val="1"/>
         <c:smooth val="0"/>
-        <c:axId val="180419760"/>
-        <c:axId val="180419376"/>
+        <c:axId val="204631912"/>
+        <c:axId val="204631528"/>
       </c:lineChart>
       <c:catAx>
-        <c:axId val="179644688"/>
+        <c:axId val="204628712"/>
         <c:scaling>
           <c:orientation val="minMax"/>
         </c:scaling>
@@ -820,7 +820,7 @@
             <a:endParaRPr lang="zh-CN"/>
           </a:p>
         </c:txPr>
-        <c:crossAx val="179290328"/>
+        <c:crossAx val="204629096"/>
         <c:crosses val="autoZero"/>
         <c:auto val="1"/>
         <c:lblAlgn val="ctr"/>
@@ -828,7 +828,7 @@
         <c:noMultiLvlLbl val="0"/>
       </c:catAx>
       <c:valAx>
-        <c:axId val="179290328"/>
+        <c:axId val="204629096"/>
         <c:scaling>
           <c:orientation val="minMax"/>
         </c:scaling>
@@ -877,12 +877,12 @@
             <a:endParaRPr lang="zh-CN"/>
           </a:p>
         </c:txPr>
-        <c:crossAx val="179644688"/>
+        <c:crossAx val="204628712"/>
         <c:crosses val="autoZero"/>
         <c:crossBetween val="between"/>
       </c:valAx>
       <c:valAx>
-        <c:axId val="180419376"/>
+        <c:axId val="204631528"/>
         <c:scaling>
           <c:orientation val="minMax"/>
           <c:min val="3.5000000000000003E-2"/>
@@ -917,12 +917,12 @@
             <a:endParaRPr lang="zh-CN"/>
           </a:p>
         </c:txPr>
-        <c:crossAx val="180419760"/>
+        <c:crossAx val="204631912"/>
         <c:crosses val="max"/>
         <c:crossBetween val="between"/>
       </c:valAx>
       <c:catAx>
-        <c:axId val="180419760"/>
+        <c:axId val="204631912"/>
         <c:scaling>
           <c:orientation val="minMax"/>
         </c:scaling>
@@ -932,7 +932,7 @@
         <c:majorTickMark val="none"/>
         <c:minorTickMark val="none"/>
         <c:tickLblPos val="nextTo"/>
-        <c:crossAx val="180419376"/>
+        <c:crossAx val="204631528"/>
         <c:crosses val="autoZero"/>
         <c:auto val="1"/>
         <c:lblAlgn val="ctr"/>
@@ -3000,11 +3000,11 @@
           <c:showBubbleSize val="0"/>
         </c:dLbls>
         <c:smooth val="0"/>
-        <c:axId val="179386912"/>
-        <c:axId val="180536688"/>
+        <c:axId val="204804760"/>
+        <c:axId val="204813848"/>
       </c:lineChart>
       <c:dateAx>
-        <c:axId val="179386912"/>
+        <c:axId val="204804760"/>
         <c:scaling>
           <c:orientation val="minMax"/>
         </c:scaling>
@@ -3059,14 +3059,14 @@
             <a:endParaRPr lang="zh-CN"/>
           </a:p>
         </c:txPr>
-        <c:crossAx val="180536688"/>
+        <c:crossAx val="204813848"/>
         <c:crosses val="autoZero"/>
         <c:auto val="1"/>
         <c:lblOffset val="100"/>
         <c:baseTimeUnit val="days"/>
       </c:dateAx>
       <c:valAx>
-        <c:axId val="180536688"/>
+        <c:axId val="204813848"/>
         <c:scaling>
           <c:orientation val="minMax"/>
           <c:min val="4.0000000000000008E-2"/>
@@ -3116,7 +3116,7 @@
             <a:endParaRPr lang="zh-CN"/>
           </a:p>
         </c:txPr>
-        <c:crossAx val="179386912"/>
+        <c:crossAx val="204804760"/>
         <c:crosses val="autoZero"/>
         <c:crossBetween val="between"/>
         <c:majorUnit val="2.0000000000000005E-3"/>
@@ -3496,8 +3496,8 @@
           <c:showBubbleSize val="0"/>
         </c:dLbls>
         <c:gapWidth val="247"/>
-        <c:axId val="181288368"/>
-        <c:axId val="180621952"/>
+        <c:axId val="204585880"/>
+        <c:axId val="148614832"/>
       </c:barChart>
       <c:lineChart>
         <c:grouping val="standard"/>
@@ -3784,11 +3784,11 @@
         </c:dLbls>
         <c:marker val="1"/>
         <c:smooth val="0"/>
-        <c:axId val="180622736"/>
-        <c:axId val="180622344"/>
+        <c:axId val="148615616"/>
+        <c:axId val="148615224"/>
       </c:lineChart>
       <c:catAx>
-        <c:axId val="181288368"/>
+        <c:axId val="204585880"/>
         <c:scaling>
           <c:orientation val="minMax"/>
         </c:scaling>
@@ -3828,7 +3828,7 @@
             <a:endParaRPr lang="zh-CN"/>
           </a:p>
         </c:txPr>
-        <c:crossAx val="180621952"/>
+        <c:crossAx val="148614832"/>
         <c:crosses val="autoZero"/>
         <c:auto val="1"/>
         <c:lblAlgn val="ctr"/>
@@ -3836,7 +3836,7 @@
         <c:noMultiLvlLbl val="0"/>
       </c:catAx>
       <c:valAx>
-        <c:axId val="180621952"/>
+        <c:axId val="148614832"/>
         <c:scaling>
           <c:orientation val="minMax"/>
         </c:scaling>
@@ -3885,12 +3885,12 @@
             <a:endParaRPr lang="zh-CN"/>
           </a:p>
         </c:txPr>
-        <c:crossAx val="181288368"/>
+        <c:crossAx val="204585880"/>
         <c:crosses val="autoZero"/>
         <c:crossBetween val="between"/>
       </c:valAx>
       <c:valAx>
-        <c:axId val="180622344"/>
+        <c:axId val="148615224"/>
         <c:scaling>
           <c:orientation val="minMax"/>
           <c:min val="3.5000000000000003E-2"/>
@@ -3925,12 +3925,12 @@
             <a:endParaRPr lang="zh-CN"/>
           </a:p>
         </c:txPr>
-        <c:crossAx val="180622736"/>
+        <c:crossAx val="148615616"/>
         <c:crosses val="max"/>
         <c:crossBetween val="between"/>
       </c:valAx>
       <c:catAx>
-        <c:axId val="180622736"/>
+        <c:axId val="148615616"/>
         <c:scaling>
           <c:orientation val="minMax"/>
         </c:scaling>
@@ -3940,7 +3940,7 @@
         <c:majorTickMark val="none"/>
         <c:minorTickMark val="none"/>
         <c:tickLblPos val="nextTo"/>
-        <c:crossAx val="180622344"/>
+        <c:crossAx val="148615224"/>
         <c:crosses val="autoZero"/>
         <c:auto val="1"/>
         <c:lblAlgn val="ctr"/>
@@ -6011,11 +6011,11 @@
           <c:showBubbleSize val="0"/>
         </c:dLbls>
         <c:smooth val="0"/>
-        <c:axId val="180623520"/>
-        <c:axId val="180623912"/>
+        <c:axId val="148616400"/>
+        <c:axId val="148616792"/>
       </c:lineChart>
       <c:dateAx>
-        <c:axId val="180623520"/>
+        <c:axId val="148616400"/>
         <c:scaling>
           <c:orientation val="minMax"/>
         </c:scaling>
@@ -6070,14 +6070,14 @@
             <a:endParaRPr lang="zh-CN"/>
           </a:p>
         </c:txPr>
-        <c:crossAx val="180623912"/>
+        <c:crossAx val="148616792"/>
         <c:crosses val="autoZero"/>
         <c:auto val="1"/>
         <c:lblOffset val="100"/>
         <c:baseTimeUnit val="days"/>
       </c:dateAx>
       <c:valAx>
-        <c:axId val="180623912"/>
+        <c:axId val="148616792"/>
         <c:scaling>
           <c:orientation val="minMax"/>
           <c:min val="4.0000000000000008E-2"/>
@@ -6127,7 +6127,7 @@
             <a:endParaRPr lang="zh-CN"/>
           </a:p>
         </c:txPr>
-        <c:crossAx val="180623520"/>
+        <c:crossAx val="148616400"/>
         <c:crosses val="autoZero"/>
         <c:crossBetween val="between"/>
         <c:majorUnit val="2.0000000000000005E-3"/>
@@ -6551,11 +6551,11 @@
         </c:dLbls>
         <c:marker val="1"/>
         <c:smooth val="0"/>
-        <c:axId val="180624696"/>
-        <c:axId val="180625088"/>
+        <c:axId val="148617576"/>
+        <c:axId val="205598424"/>
       </c:lineChart>
       <c:catAx>
-        <c:axId val="180624696"/>
+        <c:axId val="148617576"/>
         <c:scaling>
           <c:orientation val="minMax"/>
         </c:scaling>
@@ -6595,7 +6595,7 @@
             <a:endParaRPr lang="zh-CN"/>
           </a:p>
         </c:txPr>
-        <c:crossAx val="180625088"/>
+        <c:crossAx val="205598424"/>
         <c:crosses val="autoZero"/>
         <c:auto val="1"/>
         <c:lblAlgn val="ctr"/>
@@ -6603,7 +6603,7 @@
         <c:noMultiLvlLbl val="0"/>
       </c:catAx>
       <c:valAx>
-        <c:axId val="180625088"/>
+        <c:axId val="205598424"/>
         <c:scaling>
           <c:orientation val="minMax"/>
           <c:max val="4.8000000000000008E-2"/>
@@ -6654,7 +6654,7 @@
             <a:endParaRPr lang="zh-CN"/>
           </a:p>
         </c:txPr>
-        <c:crossAx val="180624696"/>
+        <c:crossAx val="148617576"/>
         <c:crosses val="autoZero"/>
         <c:crossBetween val="between"/>
       </c:valAx>
@@ -7792,11 +7792,11 @@
           <c:showBubbleSize val="0"/>
         </c:dLbls>
         <c:smooth val="0"/>
-        <c:axId val="180625872"/>
-        <c:axId val="180626264"/>
+        <c:axId val="205599208"/>
+        <c:axId val="205599600"/>
       </c:lineChart>
       <c:dateAx>
-        <c:axId val="180625872"/>
+        <c:axId val="205599208"/>
         <c:scaling>
           <c:orientation val="minMax"/>
         </c:scaling>
@@ -7851,7 +7851,7 @@
             <a:endParaRPr lang="zh-CN"/>
           </a:p>
         </c:txPr>
-        <c:crossAx val="180626264"/>
+        <c:crossAx val="205599600"/>
         <c:crosses val="autoZero"/>
         <c:auto val="1"/>
         <c:lblOffset val="100"/>
@@ -7860,7 +7860,7 @@
         <c:majorTimeUnit val="days"/>
       </c:dateAx>
       <c:valAx>
-        <c:axId val="180626264"/>
+        <c:axId val="205599600"/>
         <c:scaling>
           <c:orientation val="minMax"/>
         </c:scaling>
@@ -7909,7 +7909,7 @@
             <a:endParaRPr lang="zh-CN"/>
           </a:p>
         </c:txPr>
-        <c:crossAx val="180625872"/>
+        <c:crossAx val="205599208"/>
         <c:crosses val="autoZero"/>
         <c:crossBetween val="between"/>
       </c:valAx>
@@ -8332,11 +8332,11 @@
         </c:dLbls>
         <c:marker val="1"/>
         <c:smooth val="0"/>
-        <c:axId val="180627048"/>
-        <c:axId val="180627440"/>
+        <c:axId val="205600384"/>
+        <c:axId val="205600776"/>
       </c:lineChart>
       <c:catAx>
-        <c:axId val="180627048"/>
+        <c:axId val="205600384"/>
         <c:scaling>
           <c:orientation val="minMax"/>
         </c:scaling>
@@ -8376,7 +8376,7 @@
             <a:endParaRPr lang="zh-CN"/>
           </a:p>
         </c:txPr>
-        <c:crossAx val="180627440"/>
+        <c:crossAx val="205600776"/>
         <c:crosses val="autoZero"/>
         <c:auto val="1"/>
         <c:lblAlgn val="ctr"/>
@@ -8384,7 +8384,7 @@
         <c:noMultiLvlLbl val="0"/>
       </c:catAx>
       <c:valAx>
-        <c:axId val="180627440"/>
+        <c:axId val="205600776"/>
         <c:scaling>
           <c:orientation val="minMax"/>
           <c:max val="4.7000000000000007E-2"/>
@@ -8435,7 +8435,7 @@
             <a:endParaRPr lang="zh-CN"/>
           </a:p>
         </c:txPr>
-        <c:crossAx val="180627048"/>
+        <c:crossAx val="205600384"/>
         <c:crosses val="autoZero"/>
         <c:crossBetween val="between"/>
       </c:valAx>
@@ -9577,11 +9577,11 @@
           <c:showBubbleSize val="0"/>
         </c:dLbls>
         <c:smooth val="0"/>
-        <c:axId val="180628224"/>
-        <c:axId val="180628616"/>
+        <c:axId val="205601560"/>
+        <c:axId val="205601952"/>
       </c:lineChart>
       <c:dateAx>
-        <c:axId val="180628224"/>
+        <c:axId val="205601560"/>
         <c:scaling>
           <c:orientation val="minMax"/>
         </c:scaling>
@@ -9636,7 +9636,7 @@
             <a:endParaRPr lang="zh-CN"/>
           </a:p>
         </c:txPr>
-        <c:crossAx val="180628616"/>
+        <c:crossAx val="205601952"/>
         <c:crosses val="autoZero"/>
         <c:auto val="1"/>
         <c:lblOffset val="100"/>
@@ -9645,7 +9645,7 @@
         <c:majorTimeUnit val="days"/>
       </c:dateAx>
       <c:valAx>
-        <c:axId val="180628616"/>
+        <c:axId val="205601952"/>
         <c:scaling>
           <c:orientation val="minMax"/>
           <c:min val="-1.0000000000000002E-3"/>
@@ -9695,7 +9695,7 @@
             <a:endParaRPr lang="zh-CN"/>
           </a:p>
         </c:txPr>
-        <c:crossAx val="180628224"/>
+        <c:crossAx val="205601560"/>
         <c:crosses val="autoZero"/>
         <c:crossBetween val="between"/>
       </c:valAx>
@@ -13910,7 +13910,7 @@
           <a:p>
             <a:fld id="{AA678B55-319B-2D4F-AE49-6C1B6E1A4DDA}" type="datetimeFigureOut">
               <a:rPr lang="en-US" smtClean="0"/>
-              <a:t>5/9/2014</a:t>
+              <a:t>6/20/2014</a:t>
             </a:fld>
             <a:endParaRPr lang="en-GB"/>
           </a:p>
@@ -14076,7 +14076,7 @@
           <a:p>
             <a:fld id="{2D9CAF8C-0805-8440-B43D-DCCAAA4D80CE}" type="datetimeFigureOut">
               <a:rPr lang="en-US" smtClean="0"/>
-              <a:t>5/9/2014</a:t>
+              <a:t>6/20/2014</a:t>
             </a:fld>
             <a:endParaRPr lang="en-GB"/>
           </a:p>
@@ -23328,7 +23328,35 @@
                 <a:latin typeface="微软雅黑" panose="020B0503020204020204" pitchFamily="34" charset="-122"/>
                 <a:ea typeface="微软雅黑" panose="020B0503020204020204" pitchFamily="34" charset="-122"/>
               </a:rPr>
-              <a:t>曲线在中登期限由比较明显的流动性溢价，在短端的形状不甚领人满意。</a:t>
+              <a:t>曲线在</a:t>
+            </a:r>
+            <a:r>
+              <a:rPr lang="zh-CN" altLang="en-US" dirty="0" smtClean="0">
+                <a:latin typeface="微软雅黑" panose="020B0503020204020204" pitchFamily="34" charset="-122"/>
+                <a:ea typeface="微软雅黑" panose="020B0503020204020204" pitchFamily="34" charset="-122"/>
+              </a:rPr>
+              <a:t>中等期限</a:t>
+            </a:r>
+            <a:r>
+              <a:rPr lang="zh-CN" altLang="en-US" dirty="0">
+                <a:latin typeface="微软雅黑" panose="020B0503020204020204" pitchFamily="34" charset="-122"/>
+                <a:ea typeface="微软雅黑" panose="020B0503020204020204" pitchFamily="34" charset="-122"/>
+              </a:rPr>
+              <a:t>有</a:t>
+            </a:r>
+            <a:r>
+              <a:rPr lang="zh-CN" altLang="en-US" dirty="0" smtClean="0">
+                <a:latin typeface="微软雅黑" panose="020B0503020204020204" pitchFamily="34" charset="-122"/>
+                <a:ea typeface="微软雅黑" panose="020B0503020204020204" pitchFamily="34" charset="-122"/>
+              </a:rPr>
+              <a:t>比较</a:t>
+            </a:r>
+            <a:r>
+              <a:rPr lang="zh-CN" altLang="en-US" dirty="0" smtClean="0">
+                <a:latin typeface="微软雅黑" panose="020B0503020204020204" pitchFamily="34" charset="-122"/>
+                <a:ea typeface="微软雅黑" panose="020B0503020204020204" pitchFamily="34" charset="-122"/>
+              </a:rPr>
+              <a:t>明显的流动性溢价，在短端的形状不甚领人满意。</a:t>
             </a:r>
             <a:endParaRPr lang="zh-CN" altLang="en-US" dirty="0">
               <a:latin typeface="微软雅黑" panose="020B0503020204020204" pitchFamily="34" charset="-122"/>

</xml_diff>